<commit_message>
Created the update drain script. Added update functions to common.sh and rs-update scripts. Introduced a new CMD rs-script : rs-update, which operates the VMRs during upgrades.
</commit_message>
<xml_diff>
--- a/resources/openshift-presentation.pptx
+++ b/resources/openshift-presentation.pptx
@@ -213,7 +213,7 @@
           <a:p>
             <a:fld id="{2A4B08CC-DC44-4989-87E5-2A014D8E7470}" type="datetimeFigureOut">
               <a:rPr lang="en-US" smtClean="0"/>
-              <a:t>3/6/17</a:t>
+              <a:t>3/7/17</a:t>
             </a:fld>
             <a:endParaRPr lang="en-US"/>
           </a:p>
@@ -5908,6 +5908,13 @@
   <p:clrMapOvr>
     <a:masterClrMapping/>
   </p:clrMapOvr>
+  <p:timing>
+    <p:tnLst>
+      <p:par>
+        <p:cTn id="1" dur="indefinite" restart="never" nodeType="tmRoot"/>
+      </p:par>
+    </p:tnLst>
+  </p:timing>
 </p:sld>
 </file>
 
@@ -5981,7 +5988,6 @@
               <a:rPr lang="en-CA" sz="2800"/>
               <a:t>-messaging-demo</a:t>
             </a:r>
-            <a:endParaRPr lang="en-CA" sz="2800"/>
           </a:p>
         </p:txBody>
       </p:sp>
@@ -6157,6 +6163,13 @@
   <p:clrMapOvr>
     <a:masterClrMapping/>
   </p:clrMapOvr>
+  <p:timing>
+    <p:tnLst>
+      <p:par>
+        <p:cTn id="1" dur="indefinite" restart="never" nodeType="tmRoot"/>
+      </p:par>
+    </p:tnLst>
+  </p:timing>
 </p:sld>
 </file>
 
@@ -6276,6 +6289,13 @@
   <p:clrMapOvr>
     <a:masterClrMapping/>
   </p:clrMapOvr>
+  <p:timing>
+    <p:tnLst>
+      <p:par>
+        <p:cTn id="1" dur="indefinite" restart="never" nodeType="tmRoot"/>
+      </p:par>
+    </p:tnLst>
+  </p:timing>
 </p:sld>
 </file>
 
@@ -6457,6 +6477,13 @@
   <p:clrMapOvr>
     <a:masterClrMapping/>
   </p:clrMapOvr>
+  <p:timing>
+    <p:tnLst>
+      <p:par>
+        <p:cTn id="1" dur="indefinite" restart="never" nodeType="tmRoot"/>
+      </p:par>
+    </p:tnLst>
+  </p:timing>
 </p:sld>
 </file>
 
@@ -6583,7 +6610,6 @@
               <a:rPr lang="en-CA" smtClean="0"/>
               <a:t> way.</a:t>
             </a:r>
-            <a:endParaRPr lang="en-CA" smtClean="0"/>
           </a:p>
           <a:p>
             <a:endParaRPr lang="en-CA"/>
@@ -6631,6 +6657,13 @@
   <p:clrMapOvr>
     <a:masterClrMapping/>
   </p:clrMapOvr>
+  <p:timing>
+    <p:tnLst>
+      <p:par>
+        <p:cTn id="1" dur="indefinite" restart="never" nodeType="tmRoot"/>
+      </p:par>
+    </p:tnLst>
+  </p:timing>
 </p:sld>
 </file>
 
@@ -6689,11 +6722,7 @@
             </a:r>
             <a:r>
               <a:rPr lang="en-US" sz="2400" smtClean="0"/>
-              <a:t> images</a:t>
-            </a:r>
-            <a:r>
-              <a:rPr lang="en-US" sz="2400" smtClean="0"/>
-              <a:t>.</a:t>
+              <a:t> images.</a:t>
             </a:r>
           </a:p>
           <a:p>
@@ -6816,7 +6845,6 @@
               <a:rPr lang="en-US" sz="2400" smtClean="0"/>
               <a:t> applications compile into a standalone fat jar, they works with this S2I image.</a:t>
             </a:r>
-            <a:endParaRPr lang="en-US" sz="2400" smtClean="0"/>
           </a:p>
           <a:p>
             <a:endParaRPr lang="en-US" sz="2400"/>
@@ -6861,6 +6889,13 @@
   <p:clrMapOvr>
     <a:masterClrMapping/>
   </p:clrMapOvr>
+  <p:timing>
+    <p:tnLst>
+      <p:par>
+        <p:cTn id="1" dur="indefinite" restart="never" nodeType="tmRoot"/>
+      </p:par>
+    </p:tnLst>
+  </p:timing>
 </p:sld>
 </file>
 
@@ -7185,22 +7220,13 @@
             </a:r>
             <a:r>
               <a:rPr lang="en-US" dirty="0" smtClean="0"/>
-              <a:t> </a:t>
-            </a:r>
-            <a:r>
-              <a:rPr lang="en-US" dirty="0" smtClean="0"/>
-              <a:t>templates.</a:t>
-            </a:r>
-            <a:endParaRPr lang="en-US" dirty="0" smtClean="0"/>
+              <a:t> templates.</a:t>
+            </a:r>
           </a:p>
           <a:p>
             <a:r>
               <a:rPr lang="en-US" sz="2400" dirty="0" smtClean="0"/>
-              <a:t>Sample cloud application </a:t>
-            </a:r>
-            <a:r>
-              <a:rPr lang="en-US" sz="2400" dirty="0" smtClean="0"/>
-              <a:t>was created by Mark S. to demonstrate the VMR in PCF.  It can be applied in the context of other platform such as </a:t>
+              <a:t>Sample cloud application was created by Mark S. to demonstrate the VMR in PCF.  It can be applied in the context of other platform such as </a:t>
             </a:r>
             <a:r>
               <a:rPr lang="en-US" sz="2400" dirty="0" err="1" smtClean="0"/>
@@ -7208,11 +7234,7 @@
             </a:r>
             <a:r>
               <a:rPr lang="en-US" sz="2400" dirty="0" smtClean="0"/>
-              <a:t>, so it was used for this demonstration.  It is </a:t>
-            </a:r>
-            <a:r>
-              <a:rPr lang="en-US" sz="2400" dirty="0" smtClean="0"/>
-              <a:t>made of 2 micro services:</a:t>
+              <a:t>, so it was used for this demonstration.  It is made of 2 micro services:</a:t>
             </a:r>
           </a:p>
           <a:p>
@@ -7241,15 +7263,7 @@
           <a:p>
             <a:r>
               <a:rPr lang="en-US" sz="2400" dirty="0" smtClean="0"/>
-              <a:t>The sample application’s template </a:t>
-            </a:r>
-            <a:r>
-              <a:rPr lang="en-US" sz="2400" dirty="0" smtClean="0"/>
-              <a:t>will </a:t>
-            </a:r>
-            <a:r>
-              <a:rPr lang="en-US" sz="2400" dirty="0" smtClean="0"/>
-              <a:t>deploy a VMR in </a:t>
+              <a:t>The sample application’s template will deploy a VMR in </a:t>
             </a:r>
             <a:r>
               <a:rPr lang="en-US" sz="2400" dirty="0" err="1" smtClean="0"/>
@@ -7272,6 +7286,13 @@
   <p:clrMapOvr>
     <a:masterClrMapping/>
   </p:clrMapOvr>
+  <p:timing>
+    <p:tnLst>
+      <p:par>
+        <p:cTn id="1" dur="indefinite" restart="never" nodeType="tmRoot"/>
+      </p:par>
+    </p:tnLst>
+  </p:timing>
 </p:sld>
 </file>
 
@@ -7329,6 +7350,13 @@
   <p:clrMapOvr>
     <a:masterClrMapping/>
   </p:clrMapOvr>
+  <p:timing>
+    <p:tnLst>
+      <p:par>
+        <p:cTn id="1" dur="indefinite" restart="never" nodeType="tmRoot"/>
+      </p:par>
+    </p:tnLst>
+  </p:timing>
 </p:sld>
 </file>
 
@@ -7608,16 +7636,6 @@
               </a:rPr>
               <a:t>Routing Layer</a:t>
             </a:r>
-            <a:endParaRPr kumimoji="0" lang="en-CA" i="0" u="none" strike="noStrike" cap="none" normalizeH="0" baseline="0" dirty="0" smtClean="0">
-              <a:ln>
-                <a:noFill/>
-              </a:ln>
-              <a:solidFill>
-                <a:schemeClr val="tx1"/>
-              </a:solidFill>
-              <a:effectLst/>
-              <a:latin typeface="Arial" charset="0"/>
-            </a:endParaRPr>
           </a:p>
         </p:txBody>
       </p:sp>
@@ -8197,16 +8215,6 @@
               </a:rPr>
               <a:t>Authentication</a:t>
             </a:r>
-            <a:endParaRPr kumimoji="0" lang="en-CA" sz="1400" i="0" u="none" strike="noStrike" cap="none" normalizeH="0" baseline="0" dirty="0" smtClean="0">
-              <a:ln>
-                <a:noFill/>
-              </a:ln>
-              <a:solidFill>
-                <a:schemeClr val="tx1"/>
-              </a:solidFill>
-              <a:effectLst/>
-              <a:latin typeface="Arial" charset="0"/>
-            </a:endParaRPr>
           </a:p>
         </p:txBody>
       </p:sp>
@@ -8283,16 +8291,6 @@
               </a:rPr>
               <a:t>Data Store</a:t>
             </a:r>
-            <a:endParaRPr kumimoji="0" lang="en-CA" sz="1400" i="0" u="none" strike="noStrike" cap="none" normalizeH="0" baseline="0" dirty="0" smtClean="0">
-              <a:ln>
-                <a:noFill/>
-              </a:ln>
-              <a:solidFill>
-                <a:schemeClr val="tx1"/>
-              </a:solidFill>
-              <a:effectLst/>
-              <a:latin typeface="Arial" charset="0"/>
-            </a:endParaRPr>
           </a:p>
         </p:txBody>
       </p:sp>
@@ -8369,16 +8367,6 @@
               </a:rPr>
               <a:t>Scheduler</a:t>
             </a:r>
-            <a:endParaRPr kumimoji="0" lang="en-CA" sz="1400" i="0" u="none" strike="noStrike" cap="none" normalizeH="0" baseline="0" dirty="0" smtClean="0">
-              <a:ln>
-                <a:noFill/>
-              </a:ln>
-              <a:solidFill>
-                <a:schemeClr val="tx1"/>
-              </a:solidFill>
-              <a:effectLst/>
-              <a:latin typeface="Arial" charset="0"/>
-            </a:endParaRPr>
           </a:p>
         </p:txBody>
       </p:sp>
@@ -8494,16 +8482,6 @@
               </a:rPr>
               <a:t>Replication</a:t>
             </a:r>
-            <a:endParaRPr kumimoji="0" lang="en-CA" sz="1400" i="0" u="none" strike="noStrike" cap="none" normalizeH="0" baseline="0" dirty="0" smtClean="0">
-              <a:ln>
-                <a:noFill/>
-              </a:ln>
-              <a:solidFill>
-                <a:schemeClr val="tx1"/>
-              </a:solidFill>
-              <a:effectLst/>
-              <a:latin typeface="Arial" charset="0"/>
-            </a:endParaRPr>
           </a:p>
         </p:txBody>
       </p:sp>
@@ -8610,16 +8588,6 @@
               </a:rPr>
               <a:t>Build Controller</a:t>
             </a:r>
-            <a:endParaRPr kumimoji="0" lang="en-CA" sz="1400" i="0" u="none" strike="noStrike" cap="none" normalizeH="0" baseline="0" dirty="0" smtClean="0">
-              <a:ln>
-                <a:noFill/>
-              </a:ln>
-              <a:solidFill>
-                <a:schemeClr val="tx1"/>
-              </a:solidFill>
-              <a:effectLst/>
-              <a:latin typeface="Arial" charset="0"/>
-            </a:endParaRPr>
           </a:p>
         </p:txBody>
       </p:sp>
@@ -8696,16 +8664,6 @@
               </a:rPr>
               <a:t>API Server</a:t>
             </a:r>
-            <a:endParaRPr kumimoji="0" lang="en-CA" sz="1400" i="0" u="none" strike="noStrike" cap="none" normalizeH="0" baseline="0" dirty="0" smtClean="0">
-              <a:ln>
-                <a:noFill/>
-              </a:ln>
-              <a:solidFill>
-                <a:schemeClr val="tx1"/>
-              </a:solidFill>
-              <a:effectLst/>
-              <a:latin typeface="Arial" charset="0"/>
-            </a:endParaRPr>
           </a:p>
         </p:txBody>
       </p:sp>
@@ -8815,16 +8773,6 @@
               </a:rPr>
               <a:t>Controller</a:t>
             </a:r>
-            <a:endParaRPr kumimoji="0" lang="en-CA" sz="1400" i="0" u="none" strike="noStrike" cap="none" normalizeH="0" baseline="0" dirty="0" smtClean="0">
-              <a:ln>
-                <a:noFill/>
-              </a:ln>
-              <a:solidFill>
-                <a:schemeClr val="tx1"/>
-              </a:solidFill>
-              <a:effectLst/>
-              <a:latin typeface="Arial" charset="0"/>
-            </a:endParaRPr>
           </a:p>
         </p:txBody>
       </p:sp>
@@ -11697,7 +11645,7 @@
             </a:r>
             <a:r>
               <a:rPr lang="en-US" dirty="0" smtClean="0"/>
-              <a:t>) and Continuous integration</a:t>
+              <a:t>) and Continuous Integration</a:t>
             </a:r>
             <a:endParaRPr lang="en-US" dirty="0"/>
           </a:p>
@@ -13544,6 +13492,13 @@
   <p:clrMapOvr>
     <a:masterClrMapping/>
   </p:clrMapOvr>
+  <p:timing>
+    <p:tnLst>
+      <p:par>
+        <p:cTn id="1" dur="indefinite" restart="never" nodeType="tmRoot"/>
+      </p:par>
+    </p:tnLst>
+  </p:timing>
 </p:sld>
 </file>
 
@@ -14554,6 +14509,13 @@
   <p:clrMapOvr>
     <a:masterClrMapping/>
   </p:clrMapOvr>
+  <p:timing>
+    <p:tnLst>
+      <p:par>
+        <p:cTn id="1" dur="indefinite" restart="never" nodeType="tmRoot"/>
+      </p:par>
+    </p:tnLst>
+  </p:timing>
 </p:sld>
 </file>
 
@@ -14981,12 +14943,6 @@
               </a:rPr>
               <a:t>solace-messaging</a:t>
             </a:r>
-            <a:endParaRPr lang="en-CA" sz="1600" b="1" dirty="0" smtClean="0">
-              <a:solidFill>
-                <a:schemeClr val="tx1"/>
-              </a:solidFill>
-              <a:latin typeface="Arial" charset="0"/>
-            </a:endParaRPr>
           </a:p>
           <a:p>
             <a:pPr marL="342900" marR="0" indent="-342900" algn="l" defTabSz="914400" rtl="0" eaLnBrk="1" fontAlgn="base" latinLnBrk="0" hangingPunct="1">
@@ -16308,6 +16264,13 @@
   <p:clrMapOvr>
     <a:masterClrMapping/>
   </p:clrMapOvr>
+  <p:timing>
+    <p:tnLst>
+      <p:par>
+        <p:cTn id="1" dur="indefinite" restart="never" nodeType="tmRoot"/>
+      </p:par>
+    </p:tnLst>
+  </p:timing>
 </p:sld>
 </file>
 
@@ -16880,12 +16843,6 @@
               </a:rPr>
               <a:t>aggregator</a:t>
             </a:r>
-            <a:endParaRPr lang="en-CA" sz="1600" b="1" dirty="0" smtClean="0">
-              <a:solidFill>
-                <a:schemeClr val="tx1"/>
-              </a:solidFill>
-              <a:latin typeface="Arial" charset="0"/>
-            </a:endParaRPr>
           </a:p>
           <a:p>
             <a:pPr marL="342900" marR="0" indent="-342900" algn="l" defTabSz="914400" rtl="0" eaLnBrk="1" fontAlgn="base" latinLnBrk="0" hangingPunct="1">
@@ -17040,12 +16997,6 @@
               </a:rPr>
               <a:t>https://aggregator.&lt;domain&gt;</a:t>
             </a:r>
-            <a:endParaRPr lang="en-CA" sz="1600" b="1" dirty="0" smtClean="0">
-              <a:solidFill>
-                <a:schemeClr val="tx1"/>
-              </a:solidFill>
-              <a:latin typeface="Arial" charset="0"/>
-            </a:endParaRPr>
           </a:p>
           <a:p>
             <a:pPr marL="342900" marR="0" indent="-342900" algn="l" defTabSz="914400" rtl="0" eaLnBrk="1" fontAlgn="base" latinLnBrk="0" hangingPunct="1">
@@ -17256,6 +17207,13 @@
   <p:clrMapOvr>
     <a:masterClrMapping/>
   </p:clrMapOvr>
+  <p:timing>
+    <p:tnLst>
+      <p:par>
+        <p:cTn id="1" dur="indefinite" restart="never" nodeType="tmRoot"/>
+      </p:par>
+    </p:tnLst>
+  </p:timing>
 </p:sld>
 </file>
 
@@ -20017,12 +19975,6 @@
               </a:rPr>
               <a:t>SMF</a:t>
             </a:r>
-            <a:endParaRPr lang="en-CA" sz="1600" b="1" dirty="0" smtClean="0">
-              <a:solidFill>
-                <a:schemeClr val="tx1"/>
-              </a:solidFill>
-              <a:latin typeface="Arial" charset="0"/>
-            </a:endParaRPr>
           </a:p>
           <a:p>
             <a:pPr marL="342900" marR="0" indent="-342900" algn="l" defTabSz="914400" rtl="0" eaLnBrk="1" fontAlgn="base" latinLnBrk="0" hangingPunct="1">
@@ -20504,6 +20456,13 @@
   <p:clrMapOvr>
     <a:masterClrMapping/>
   </p:clrMapOvr>
+  <p:timing>
+    <p:tnLst>
+      <p:par>
+        <p:cTn id="1" dur="indefinite" restart="never" nodeType="tmRoot"/>
+      </p:par>
+    </p:tnLst>
+  </p:timing>
 </p:sld>
 </file>
 

</xml_diff>

<commit_message>
Adding instructions on how to install Openshift in AWS to get a simple environment for testing the VMR and the demo.
</commit_message>
<xml_diff>
--- a/resources/openshift-presentation.pptx
+++ b/resources/openshift-presentation.pptx
@@ -213,7 +213,7 @@
           <a:p>
             <a:fld id="{2A4B08CC-DC44-4989-87E5-2A014D8E7470}" type="datetimeFigureOut">
               <a:rPr lang="en-US" smtClean="0"/>
-              <a:t>3/7/17</a:t>
+              <a:t>3/14/17</a:t>
             </a:fld>
             <a:endParaRPr lang="en-US"/>
           </a:p>
@@ -7877,7 +7877,7 @@
         </p:blipFill>
         <p:spPr bwMode="auto">
           <a:xfrm>
-            <a:off x="3174557" y="5950906"/>
+            <a:off x="3176537" y="5940216"/>
             <a:ext cx="739780" cy="718706"/>
           </a:xfrm>
           <a:prstGeom prst="rect">
@@ -11431,6 +11431,32 @@
           </p:txBody>
         </p:sp>
       </p:grpSp>
+      <p:sp>
+        <p:nvSpPr>
+          <p:cNvPr id="2" name="TextBox 1"/>
+          <p:cNvSpPr txBox="1"/>
+          <p:nvPr/>
+        </p:nvSpPr>
+        <p:spPr>
+          <a:xfrm>
+            <a:off x="7158527" y="990600"/>
+            <a:ext cx="184731" cy="369332"/>
+          </a:xfrm>
+          <a:prstGeom prst="rect">
+            <a:avLst/>
+          </a:prstGeom>
+          <a:noFill/>
+        </p:spPr>
+        <p:txBody>
+          <a:bodyPr wrap="none" rtlCol="0">
+            <a:spAutoFit/>
+          </a:bodyPr>
+          <a:lstStyle/>
+          <a:p>
+            <a:endParaRPr lang="en-US" dirty="0"/>
+          </a:p>
+        </p:txBody>
+      </p:sp>
     </p:spTree>
     <p:extLst>
       <p:ext uri="{BB962C8B-B14F-4D97-AF65-F5344CB8AC3E}">

</xml_diff>